<commit_message>
added url in the documents
</commit_message>
<xml_diff>
--- a/DOCUMENTATION/Group1PPT.pptx
+++ b/DOCUMENTATION/Group1PPT.pptx
@@ -917,7 +917,7 @@
   <pc:docChgLst>
     <pc:chgData name="kuldeep bhimani" userId="c6f4122ae9dc5654" providerId="LiveId" clId="{9E60E78B-846A-4736-BAE6-3B77E33AD8B2}"/>
     <pc:docChg chg="undo custSel addSld modSld">
-      <pc:chgData name="kuldeep bhimani" userId="c6f4122ae9dc5654" providerId="LiveId" clId="{9E60E78B-846A-4736-BAE6-3B77E33AD8B2}" dt="2022-04-06T02:04:02.443" v="1459" actId="20577"/>
+      <pc:chgData name="kuldeep bhimani" userId="c6f4122ae9dc5654" providerId="LiveId" clId="{9E60E78B-846A-4736-BAE6-3B77E33AD8B2}" dt="2022-04-06T02:28:24.371" v="1466" actId="1076"/>
       <pc:docMkLst>
         <pc:docMk/>
       </pc:docMkLst>
@@ -950,6 +950,21 @@
             <ac:graphicFrameMk id="4" creationId="{082116F6-8C66-E97E-2DC9-DAC374086986}"/>
           </ac:graphicFrameMkLst>
         </pc:graphicFrameChg>
+      </pc:sldChg>
+      <pc:sldChg chg="modSp mod">
+        <pc:chgData name="kuldeep bhimani" userId="c6f4122ae9dc5654" providerId="LiveId" clId="{9E60E78B-846A-4736-BAE6-3B77E33AD8B2}" dt="2022-04-06T02:28:24.371" v="1466" actId="1076"/>
+        <pc:sldMkLst>
+          <pc:docMk/>
+          <pc:sldMk cId="3200404707" sldId="275"/>
+        </pc:sldMkLst>
+        <pc:spChg chg="mod">
+          <ac:chgData name="kuldeep bhimani" userId="c6f4122ae9dc5654" providerId="LiveId" clId="{9E60E78B-846A-4736-BAE6-3B77E33AD8B2}" dt="2022-04-06T02:28:24.371" v="1466" actId="1076"/>
+          <ac:spMkLst>
+            <pc:docMk/>
+            <pc:sldMk cId="3200404707" sldId="275"/>
+            <ac:spMk id="2" creationId="{00000000-0000-0000-0000-000000000000}"/>
+          </ac:spMkLst>
+        </pc:spChg>
       </pc:sldChg>
       <pc:sldChg chg="addSp delSp modSp mod">
         <pc:chgData name="kuldeep bhimani" userId="c6f4122ae9dc5654" providerId="LiveId" clId="{9E60E78B-846A-4736-BAE6-3B77E33AD8B2}" dt="2022-04-06T01:58:12.094" v="1157" actId="2165"/>
@@ -8006,8 +8021,8 @@
         </p:nvSpPr>
         <p:spPr>
           <a:xfrm>
-            <a:off x="3906891" y="2833051"/>
-            <a:ext cx="1323512" cy="505908"/>
+            <a:off x="521110" y="1545025"/>
+            <a:ext cx="7708490" cy="2260234"/>
           </a:xfrm>
           <a:prstGeom prst="rect">
             <a:avLst/>
@@ -8020,9 +8035,58 @@
           <a:lstStyle/>
           <a:p>
             <a:r>
-              <a:rPr lang="en-US"/>
+              <a:rPr lang="en-US" dirty="0"/>
               <a:t>DEMO</a:t>
             </a:r>
+            <a:br>
+              <a:rPr lang="en-US" dirty="0"/>
+            </a:br>
+            <a:br>
+              <a:rPr lang="en-US" dirty="0"/>
+            </a:br>
+            <a:br>
+              <a:rPr lang="en-US" dirty="0"/>
+            </a:br>
+            <a:r>
+              <a:rPr lang="en-US" sz="1800" dirty="0">
+                <a:effectLst/>
+                <a:latin typeface="Calibri" panose="020F0502020204030204" pitchFamily="34" charset="0"/>
+                <a:ea typeface="Calibri" panose="020F0502020204030204" pitchFamily="34" charset="0"/>
+                <a:cs typeface="Times New Roman" panose="02020603050405020304" pitchFamily="18" charset="0"/>
+              </a:rPr>
+              <a:t>APP URL: </a:t>
+            </a:r>
+            <a:r>
+              <a:rPr lang="en-US" sz="1800" u="sng" dirty="0">
+                <a:solidFill>
+                  <a:srgbClr val="0563C1"/>
+                </a:solidFill>
+                <a:effectLst/>
+                <a:latin typeface="Segoe UI" panose="020B0502040204020203" pitchFamily="34" charset="0"/>
+                <a:ea typeface="Calibri" panose="020F0502020204030204" pitchFamily="34" charset="0"/>
+                <a:cs typeface="Times New Roman" panose="02020603050405020304" pitchFamily="18" charset="0"/>
+                <a:hlinkClick r:id="rId2" tooltip="https://mealstop-application.herokuapp.com/"/>
+              </a:rPr>
+              <a:t>https://mealstop-application.herokuapp.com/</a:t>
+            </a:r>
+            <a:r>
+              <a:rPr lang="en-US" sz="1800" dirty="0">
+                <a:effectLst/>
+                <a:latin typeface="Segoe UI" panose="020B0502040204020203" pitchFamily="34" charset="0"/>
+                <a:ea typeface="Calibri" panose="020F0502020204030204" pitchFamily="34" charset="0"/>
+                <a:cs typeface="Times New Roman" panose="02020603050405020304" pitchFamily="18" charset="0"/>
+              </a:rPr>
+              <a:t> </a:t>
+            </a:r>
+            <a:br>
+              <a:rPr lang="en-US" sz="1800" dirty="0">
+                <a:effectLst/>
+                <a:latin typeface="Calibri" panose="020F0502020204030204" pitchFamily="34" charset="0"/>
+                <a:ea typeface="Calibri" panose="020F0502020204030204" pitchFamily="34" charset="0"/>
+                <a:cs typeface="Times New Roman" panose="02020603050405020304" pitchFamily="18" charset="0"/>
+              </a:rPr>
+            </a:br>
+            <a:endParaRPr lang="en-US" dirty="0"/>
           </a:p>
         </p:txBody>
       </p:sp>
@@ -10064,12 +10128,9 @@
 </file>
 
 <file path=customXml/item1.xml><?xml version="1.0" encoding="utf-8"?>
-<?mso-contentType ?>
-<FormTemplates xmlns="http://schemas.microsoft.com/sharepoint/v3/contenttype/forms">
-  <Display>DocumentLibraryForm</Display>
-  <Edit>DocumentLibraryForm</Edit>
-  <New>DocumentLibraryForm</New>
-</FormTemplates>
+<p:properties xmlns:p="http://schemas.microsoft.com/office/2006/metadata/properties" xmlns:xsi="http://www.w3.org/2001/XMLSchema-instance" xmlns:pc="http://schemas.microsoft.com/office/infopath/2007/PartnerControls">
+  <documentManagement/>
+</p:properties>
 </file>
 
 <file path=customXml/item2.xml><?xml version="1.0" encoding="utf-8"?>
@@ -10219,15 +10280,19 @@
 </file>
 
 <file path=customXml/item3.xml><?xml version="1.0" encoding="utf-8"?>
-<p:properties xmlns:p="http://schemas.microsoft.com/office/2006/metadata/properties" xmlns:xsi="http://www.w3.org/2001/XMLSchema-instance" xmlns:pc="http://schemas.microsoft.com/office/infopath/2007/PartnerControls">
-  <documentManagement/>
-</p:properties>
+<?mso-contentType ?>
+<FormTemplates xmlns="http://schemas.microsoft.com/sharepoint/v3/contenttype/forms">
+  <Display>DocumentLibraryForm</Display>
+  <Edit>DocumentLibraryForm</Edit>
+  <New>DocumentLibraryForm</New>
+</FormTemplates>
 </file>
 
 <file path=customXml/itemProps1.xml><?xml version="1.0" encoding="utf-8"?>
-<ds:datastoreItem xmlns:ds="http://schemas.openxmlformats.org/officeDocument/2006/customXml" ds:itemID="{4DE6A202-CE8F-41E7-9B83-D8341BE5CD8A}">
+<ds:datastoreItem xmlns:ds="http://schemas.openxmlformats.org/officeDocument/2006/customXml" ds:itemID="{0F784898-B198-43D0-8B2F-E8A2FE4A6DC9}">
   <ds:schemaRefs>
-    <ds:schemaRef ds:uri="http://schemas.microsoft.com/sharepoint/v3/contenttype/forms"/>
+    <ds:schemaRef ds:uri="http://schemas.microsoft.com/office/2006/metadata/properties"/>
+    <ds:schemaRef ds:uri="http://schemas.microsoft.com/office/infopath/2007/PartnerControls"/>
   </ds:schemaRefs>
 </ds:datastoreItem>
 </file>
@@ -10251,10 +10316,9 @@
 </file>
 
 <file path=customXml/itemProps3.xml><?xml version="1.0" encoding="utf-8"?>
-<ds:datastoreItem xmlns:ds="http://schemas.openxmlformats.org/officeDocument/2006/customXml" ds:itemID="{0F784898-B198-43D0-8B2F-E8A2FE4A6DC9}">
+<ds:datastoreItem xmlns:ds="http://schemas.openxmlformats.org/officeDocument/2006/customXml" ds:itemID="{4DE6A202-CE8F-41E7-9B83-D8341BE5CD8A}">
   <ds:schemaRefs>
-    <ds:schemaRef ds:uri="http://schemas.microsoft.com/office/2006/metadata/properties"/>
-    <ds:schemaRef ds:uri="http://schemas.microsoft.com/office/infopath/2007/PartnerControls"/>
+    <ds:schemaRef ds:uri="http://schemas.microsoft.com/sharepoint/v3/contenttype/forms"/>
   </ds:schemaRefs>
 </ds:datastoreItem>
 </file>
</xml_diff>